<commit_message>
Revert "Update Final Project.pptx"
This reverts commit a2ff45e0bea17b56e6989ffa422893679f3be82b.
</commit_message>
<xml_diff>
--- a/Reports/Final Project.pptx
+++ b/Reports/Final Project.pptx
@@ -3928,15 +3928,15 @@
       </p:sp>
       <p:pic>
         <p:nvPicPr>
-          <p:cNvPr id="1026" name="Picture 2">
+          <p:cNvPr id="5" name="Picture 4">
             <a:extLst>
               <a:ext uri="{FF2B5EF4-FFF2-40B4-BE49-F238E27FC236}">
-                <a16:creationId xmlns:a16="http://schemas.microsoft.com/office/drawing/2014/main" id="{5B416E45-CB24-415A-0D7D-F5DDCD69055B}"/>
+                <a16:creationId xmlns:a16="http://schemas.microsoft.com/office/drawing/2014/main" id="{5F12355D-74CC-8A56-29C1-D65C0D37DC98}"/>
               </a:ext>
             </a:extLst>
           </p:cNvPr>
           <p:cNvPicPr>
-            <a:picLocks noChangeAspect="1" noChangeArrowheads="1"/>
+            <a:picLocks noChangeAspect="1"/>
           </p:cNvPicPr>
           <p:nvPr/>
         </p:nvPicPr>
@@ -3948,29 +3948,18 @@
               </a:ext>
             </a:extLst>
           </a:blip>
-          <a:srcRect/>
           <a:stretch>
             <a:fillRect/>
           </a:stretch>
         </p:blipFill>
-        <p:spPr bwMode="auto">
-          <a:xfrm>
-            <a:off x="10938341" y="126961"/>
-            <a:ext cx="1133475" cy="1133475"/>
+        <p:spPr>
+          <a:xfrm>
+            <a:off x="11326764" y="117986"/>
+            <a:ext cx="776748" cy="528189"/>
           </a:xfrm>
           <a:prstGeom prst="rect">
             <a:avLst/>
           </a:prstGeom>
-          <a:noFill/>
-          <a:extLst>
-            <a:ext uri="{909E8E84-426E-40DD-AFC4-6F175D3DCCD1}">
-              <a14:hiddenFill xmlns:a14="http://schemas.microsoft.com/office/drawing/2010/main">
-                <a:solidFill>
-                  <a:srgbClr val="FFFFFF"/>
-                </a:solidFill>
-              </a14:hiddenFill>
-            </a:ext>
-          </a:extLst>
         </p:spPr>
       </p:pic>
     </p:spTree>
@@ -4817,22 +4806,7 @@
             <a:pPr algn="l" rtl="0"/>
             <a:r>
               <a:rPr lang="en-US" sz="2400" dirty="0"/>
-              <a:t>- The master (the graphics module) send ‘</a:t>
-            </a:r>
-            <a:r>
-              <a:rPr lang="en-US" sz="2400" dirty="0" err="1"/>
-              <a:t>are_you_alive</a:t>
-            </a:r>
-            <a:r>
-              <a:rPr lang="en-US" sz="2400" dirty="0"/>
-              <a:t>’ message to all PCs every 0.5 seconds.</a:t>
-            </a:r>
-          </a:p>
-          <a:p>
-            <a:pPr algn="l" rtl="0"/>
-            <a:r>
-              <a:rPr lang="en-US" sz="2400" dirty="0"/>
-              <a:t>- each PC responds to this message with ‘</a:t>
+              <a:t>- Each PC sends </a:t>
             </a:r>
             <a:r>
               <a:rPr lang="en-US" sz="2400" dirty="0" err="1"/>
@@ -4840,14 +4814,14 @@
             </a:r>
             <a:r>
               <a:rPr lang="en-US" sz="2400" dirty="0"/>
-              <a:t>’ message.</a:t>
+              <a:t> to the master each 0.5sec.</a:t>
             </a:r>
           </a:p>
           <a:p>
             <a:pPr algn="l" rtl="0"/>
             <a:r>
               <a:rPr lang="en-US" sz="2400" dirty="0"/>
-              <a:t>- Not getting ‘</a:t>
+              <a:t>- Not getting </a:t>
             </a:r>
             <a:r>
               <a:rPr lang="en-US" sz="2400" dirty="0" err="1"/>
@@ -4855,7 +4829,7 @@
             </a:r>
             <a:r>
               <a:rPr lang="en-US" sz="2400" dirty="0"/>
-              <a:t>’ means the PC is down.</a:t>
+              <a:t> means the PC is down.</a:t>
             </a:r>
           </a:p>
           <a:p>
@@ -5060,7 +5034,7 @@
                   <a:srgbClr val="0070C0"/>
                 </a:solidFill>
               </a:rPr>
-              <a:t>We decided to speed it up using few ways: sending the graphics only the Y location while the X location is synced between all, don’t ask the NN whether to jump in each frame, etc.</a:t>
+              <a:t>We decided to speed it up using few ways: sending the graphics only the Y location and the X location is synced between all, don’t ask the NN whether to jump in each frame, etc.</a:t>
             </a:r>
             <a:endParaRPr lang="en-US" dirty="0"/>
           </a:p>

</xml_diff>

<commit_message>
Revert "Revert "Update Final Project.pptx""
This reverts commit e87fa133d058e0cb7090a22f280e51b7f9c20500.
</commit_message>
<xml_diff>
--- a/Reports/Final Project.pptx
+++ b/Reports/Final Project.pptx
@@ -3928,15 +3928,15 @@
       </p:sp>
       <p:pic>
         <p:nvPicPr>
-          <p:cNvPr id="5" name="Picture 4">
+          <p:cNvPr id="1026" name="Picture 2">
             <a:extLst>
               <a:ext uri="{FF2B5EF4-FFF2-40B4-BE49-F238E27FC236}">
-                <a16:creationId xmlns:a16="http://schemas.microsoft.com/office/drawing/2014/main" id="{5F12355D-74CC-8A56-29C1-D65C0D37DC98}"/>
+                <a16:creationId xmlns:a16="http://schemas.microsoft.com/office/drawing/2014/main" id="{5B416E45-CB24-415A-0D7D-F5DDCD69055B}"/>
               </a:ext>
             </a:extLst>
           </p:cNvPr>
           <p:cNvPicPr>
-            <a:picLocks noChangeAspect="1"/>
+            <a:picLocks noChangeAspect="1" noChangeArrowheads="1"/>
           </p:cNvPicPr>
           <p:nvPr/>
         </p:nvPicPr>
@@ -3948,18 +3948,29 @@
               </a:ext>
             </a:extLst>
           </a:blip>
+          <a:srcRect/>
           <a:stretch>
             <a:fillRect/>
           </a:stretch>
         </p:blipFill>
-        <p:spPr>
-          <a:xfrm>
-            <a:off x="11326764" y="117986"/>
-            <a:ext cx="776748" cy="528189"/>
+        <p:spPr bwMode="auto">
+          <a:xfrm>
+            <a:off x="10938341" y="126961"/>
+            <a:ext cx="1133475" cy="1133475"/>
           </a:xfrm>
           <a:prstGeom prst="rect">
             <a:avLst/>
           </a:prstGeom>
+          <a:noFill/>
+          <a:extLst>
+            <a:ext uri="{909E8E84-426E-40DD-AFC4-6F175D3DCCD1}">
+              <a14:hiddenFill xmlns:a14="http://schemas.microsoft.com/office/drawing/2010/main">
+                <a:solidFill>
+                  <a:srgbClr val="FFFFFF"/>
+                </a:solidFill>
+              </a14:hiddenFill>
+            </a:ext>
+          </a:extLst>
         </p:spPr>
       </p:pic>
     </p:spTree>
@@ -4806,7 +4817,22 @@
             <a:pPr algn="l" rtl="0"/>
             <a:r>
               <a:rPr lang="en-US" sz="2400" dirty="0"/>
-              <a:t>- Each PC sends </a:t>
+              <a:t>- The master (the graphics module) send ‘</a:t>
+            </a:r>
+            <a:r>
+              <a:rPr lang="en-US" sz="2400" dirty="0" err="1"/>
+              <a:t>are_you_alive</a:t>
+            </a:r>
+            <a:r>
+              <a:rPr lang="en-US" sz="2400" dirty="0"/>
+              <a:t>’ message to all PCs every 0.5 seconds.</a:t>
+            </a:r>
+          </a:p>
+          <a:p>
+            <a:pPr algn="l" rtl="0"/>
+            <a:r>
+              <a:rPr lang="en-US" sz="2400" dirty="0"/>
+              <a:t>- each PC responds to this message with ‘</a:t>
             </a:r>
             <a:r>
               <a:rPr lang="en-US" sz="2400" dirty="0" err="1"/>
@@ -4814,14 +4840,14 @@
             </a:r>
             <a:r>
               <a:rPr lang="en-US" sz="2400" dirty="0"/>
-              <a:t> to the master each 0.5sec.</a:t>
+              <a:t>’ message.</a:t>
             </a:r>
           </a:p>
           <a:p>
             <a:pPr algn="l" rtl="0"/>
             <a:r>
               <a:rPr lang="en-US" sz="2400" dirty="0"/>
-              <a:t>- Not getting </a:t>
+              <a:t>- Not getting ‘</a:t>
             </a:r>
             <a:r>
               <a:rPr lang="en-US" sz="2400" dirty="0" err="1"/>
@@ -4829,7 +4855,7 @@
             </a:r>
             <a:r>
               <a:rPr lang="en-US" sz="2400" dirty="0"/>
-              <a:t> means the PC is down.</a:t>
+              <a:t>’ means the PC is down.</a:t>
             </a:r>
           </a:p>
           <a:p>
@@ -5034,7 +5060,7 @@
                   <a:srgbClr val="0070C0"/>
                 </a:solidFill>
               </a:rPr>
-              <a:t>We decided to speed it up using few ways: sending the graphics only the Y location and the X location is synced between all, don’t ask the NN whether to jump in each frame, etc.</a:t>
+              <a:t>We decided to speed it up using few ways: sending the graphics only the Y location while the X location is synced between all, don’t ask the NN whether to jump in each frame, etc.</a:t>
             </a:r>
             <a:endParaRPr lang="en-US" dirty="0"/>
           </a:p>

</xml_diff>

<commit_message>
Revert "Revert "Revert "Update Final Project.pptx"""
This reverts commit e5cc36597732fc262747ab6663633f51b5d7a005.
</commit_message>
<xml_diff>
--- a/Reports/Final Project.pptx
+++ b/Reports/Final Project.pptx
@@ -3928,15 +3928,15 @@
       </p:sp>
       <p:pic>
         <p:nvPicPr>
-          <p:cNvPr id="1026" name="Picture 2">
+          <p:cNvPr id="5" name="Picture 4">
             <a:extLst>
               <a:ext uri="{FF2B5EF4-FFF2-40B4-BE49-F238E27FC236}">
-                <a16:creationId xmlns:a16="http://schemas.microsoft.com/office/drawing/2014/main" id="{5B416E45-CB24-415A-0D7D-F5DDCD69055B}"/>
+                <a16:creationId xmlns:a16="http://schemas.microsoft.com/office/drawing/2014/main" id="{5F12355D-74CC-8A56-29C1-D65C0D37DC98}"/>
               </a:ext>
             </a:extLst>
           </p:cNvPr>
           <p:cNvPicPr>
-            <a:picLocks noChangeAspect="1" noChangeArrowheads="1"/>
+            <a:picLocks noChangeAspect="1"/>
           </p:cNvPicPr>
           <p:nvPr/>
         </p:nvPicPr>
@@ -3948,29 +3948,18 @@
               </a:ext>
             </a:extLst>
           </a:blip>
-          <a:srcRect/>
           <a:stretch>
             <a:fillRect/>
           </a:stretch>
         </p:blipFill>
-        <p:spPr bwMode="auto">
-          <a:xfrm>
-            <a:off x="10938341" y="126961"/>
-            <a:ext cx="1133475" cy="1133475"/>
+        <p:spPr>
+          <a:xfrm>
+            <a:off x="11326764" y="117986"/>
+            <a:ext cx="776748" cy="528189"/>
           </a:xfrm>
           <a:prstGeom prst="rect">
             <a:avLst/>
           </a:prstGeom>
-          <a:noFill/>
-          <a:extLst>
-            <a:ext uri="{909E8E84-426E-40DD-AFC4-6F175D3DCCD1}">
-              <a14:hiddenFill xmlns:a14="http://schemas.microsoft.com/office/drawing/2010/main">
-                <a:solidFill>
-                  <a:srgbClr val="FFFFFF"/>
-                </a:solidFill>
-              </a14:hiddenFill>
-            </a:ext>
-          </a:extLst>
         </p:spPr>
       </p:pic>
     </p:spTree>
@@ -4817,22 +4806,7 @@
             <a:pPr algn="l" rtl="0"/>
             <a:r>
               <a:rPr lang="en-US" sz="2400" dirty="0"/>
-              <a:t>- The master (the graphics module) send ‘</a:t>
-            </a:r>
-            <a:r>
-              <a:rPr lang="en-US" sz="2400" dirty="0" err="1"/>
-              <a:t>are_you_alive</a:t>
-            </a:r>
-            <a:r>
-              <a:rPr lang="en-US" sz="2400" dirty="0"/>
-              <a:t>’ message to all PCs every 0.5 seconds.</a:t>
-            </a:r>
-          </a:p>
-          <a:p>
-            <a:pPr algn="l" rtl="0"/>
-            <a:r>
-              <a:rPr lang="en-US" sz="2400" dirty="0"/>
-              <a:t>- each PC responds to this message with ‘</a:t>
+              <a:t>- Each PC sends </a:t>
             </a:r>
             <a:r>
               <a:rPr lang="en-US" sz="2400" dirty="0" err="1"/>
@@ -4840,14 +4814,14 @@
             </a:r>
             <a:r>
               <a:rPr lang="en-US" sz="2400" dirty="0"/>
-              <a:t>’ message.</a:t>
+              <a:t> to the master each 0.5sec.</a:t>
             </a:r>
           </a:p>
           <a:p>
             <a:pPr algn="l" rtl="0"/>
             <a:r>
               <a:rPr lang="en-US" sz="2400" dirty="0"/>
-              <a:t>- Not getting ‘</a:t>
+              <a:t>- Not getting </a:t>
             </a:r>
             <a:r>
               <a:rPr lang="en-US" sz="2400" dirty="0" err="1"/>
@@ -4855,7 +4829,7 @@
             </a:r>
             <a:r>
               <a:rPr lang="en-US" sz="2400" dirty="0"/>
-              <a:t>’ means the PC is down.</a:t>
+              <a:t> means the PC is down.</a:t>
             </a:r>
           </a:p>
           <a:p>
@@ -5060,7 +5034,7 @@
                   <a:srgbClr val="0070C0"/>
                 </a:solidFill>
               </a:rPr>
-              <a:t>We decided to speed it up using few ways: sending the graphics only the Y location while the X location is synced between all, don’t ask the NN whether to jump in each frame, etc.</a:t>
+              <a:t>We decided to speed it up using few ways: sending the graphics only the Y location and the X location is synced between all, don’t ask the NN whether to jump in each frame, etc.</a:t>
             </a:r>
             <a:endParaRPr lang="en-US" dirty="0"/>
           </a:p>

</xml_diff>